<commit_message>
finixhed all the github stuff to slides
</commit_message>
<xml_diff>
--- a/CS1550_week_2_xv6_intro.pptx
+++ b/CS1550_week_2_xv6_intro.pptx
@@ -5,10 +5,10 @@
     <p:sldMasterId id="2147483672" r:id="rId1"/>
   </p:sldMasterIdLst>
   <p:notesMasterIdLst>
-    <p:notesMasterId r:id="rId55"/>
+    <p:notesMasterId r:id="rId56"/>
   </p:notesMasterIdLst>
   <p:handoutMasterIdLst>
-    <p:handoutMasterId r:id="rId56"/>
+    <p:handoutMasterId r:id="rId57"/>
   </p:handoutMasterIdLst>
   <p:sldIdLst>
     <p:sldId id="256" r:id="rId2"/>
@@ -48,22 +48,23 @@
     <p:sldId id="424" r:id="rId36"/>
     <p:sldId id="426" r:id="rId37"/>
     <p:sldId id="427" r:id="rId38"/>
-    <p:sldId id="409" r:id="rId39"/>
-    <p:sldId id="408" r:id="rId40"/>
-    <p:sldId id="410" r:id="rId41"/>
-    <p:sldId id="422" r:id="rId42"/>
-    <p:sldId id="411" r:id="rId43"/>
-    <p:sldId id="412" r:id="rId44"/>
-    <p:sldId id="413" r:id="rId45"/>
-    <p:sldId id="414" r:id="rId46"/>
-    <p:sldId id="415" r:id="rId47"/>
-    <p:sldId id="416" r:id="rId48"/>
-    <p:sldId id="417" r:id="rId49"/>
-    <p:sldId id="418" r:id="rId50"/>
-    <p:sldId id="419" r:id="rId51"/>
-    <p:sldId id="420" r:id="rId52"/>
-    <p:sldId id="406" r:id="rId53"/>
-    <p:sldId id="389" r:id="rId54"/>
+    <p:sldId id="428" r:id="rId39"/>
+    <p:sldId id="409" r:id="rId40"/>
+    <p:sldId id="408" r:id="rId41"/>
+    <p:sldId id="410" r:id="rId42"/>
+    <p:sldId id="422" r:id="rId43"/>
+    <p:sldId id="411" r:id="rId44"/>
+    <p:sldId id="412" r:id="rId45"/>
+    <p:sldId id="413" r:id="rId46"/>
+    <p:sldId id="414" r:id="rId47"/>
+    <p:sldId id="415" r:id="rId48"/>
+    <p:sldId id="416" r:id="rId49"/>
+    <p:sldId id="417" r:id="rId50"/>
+    <p:sldId id="418" r:id="rId51"/>
+    <p:sldId id="419" r:id="rId52"/>
+    <p:sldId id="420" r:id="rId53"/>
+    <p:sldId id="406" r:id="rId54"/>
+    <p:sldId id="389" r:id="rId55"/>
   </p:sldIdLst>
   <p:sldSz cx="12192000" cy="6858000"/>
   <p:notesSz cx="6858000" cy="9144000"/>
@@ -13470,13 +13471,8 @@
             <a:pPr lvl="1"/>
             <a:r>
               <a:rPr lang="en-US" dirty="0"/>
-              <a:t>Check your private GitHub repo to make sure all the code is </a:t>
-            </a:r>
-            <a:r>
-              <a:rPr lang="en-US"/>
-              <a:t>there.</a:t>
-            </a:r>
-            <a:endParaRPr lang="en-US" dirty="0"/>
+              <a:t>Check your private GitHub repo to make sure all the code is there.</a:t>
+            </a:r>
           </a:p>
         </p:txBody>
       </p:sp>
@@ -13494,6 +13490,171 @@
 </file>
 
 <file path=ppt/slides/slide38.xml><?xml version="1.0" encoding="utf-8"?>
+<p:sld xmlns:a="http://schemas.openxmlformats.org/drawingml/2006/main" xmlns:r="http://schemas.openxmlformats.org/officeDocument/2006/relationships" xmlns:p="http://schemas.openxmlformats.org/presentationml/2006/main">
+  <p:cSld>
+    <p:spTree>
+      <p:nvGrpSpPr>
+        <p:cNvPr id="1" name=""/>
+        <p:cNvGrpSpPr/>
+        <p:nvPr/>
+      </p:nvGrpSpPr>
+      <p:grpSpPr>
+        <a:xfrm>
+          <a:off x="0" y="0"/>
+          <a:ext cx="0" cy="0"/>
+          <a:chOff x="0" y="0"/>
+          <a:chExt cx="0" cy="0"/>
+        </a:xfrm>
+      </p:grpSpPr>
+      <p:sp>
+        <p:nvSpPr>
+          <p:cNvPr id="2" name="Title 1">
+            <a:extLst>
+              <a:ext uri="{FF2B5EF4-FFF2-40B4-BE49-F238E27FC236}">
+                <a16:creationId xmlns:a16="http://schemas.microsoft.com/office/drawing/2014/main" id="{D663CDBE-8DF4-40E6-A558-F343B11831B6}"/>
+              </a:ext>
+            </a:extLst>
+          </p:cNvPr>
+          <p:cNvSpPr>
+            <a:spLocks noGrp="1"/>
+          </p:cNvSpPr>
+          <p:nvPr>
+            <p:ph type="title"/>
+          </p:nvPr>
+        </p:nvSpPr>
+        <p:spPr/>
+        <p:txBody>
+          <a:bodyPr/>
+          <a:lstStyle/>
+          <a:p>
+            <a:r>
+              <a:rPr lang="en-US" dirty="0"/>
+              <a:t>My xv6 GitHub</a:t>
+            </a:r>
+          </a:p>
+        </p:txBody>
+      </p:sp>
+      <p:sp>
+        <p:nvSpPr>
+          <p:cNvPr id="3" name="Content Placeholder 2">
+            <a:extLst>
+              <a:ext uri="{FF2B5EF4-FFF2-40B4-BE49-F238E27FC236}">
+                <a16:creationId xmlns:a16="http://schemas.microsoft.com/office/drawing/2014/main" id="{F96EB19F-C6AC-453E-BB04-51DB1020EC95}"/>
+              </a:ext>
+            </a:extLst>
+          </p:cNvPr>
+          <p:cNvSpPr>
+            <a:spLocks noGrp="1"/>
+          </p:cNvSpPr>
+          <p:nvPr>
+            <p:ph idx="1"/>
+          </p:nvPr>
+        </p:nvSpPr>
+        <p:spPr/>
+        <p:txBody>
+          <a:bodyPr>
+            <a:normAutofit fontScale="92500" lnSpcReduction="10000"/>
+          </a:bodyPr>
+          <a:lstStyle/>
+          <a:p>
+            <a:r>
+              <a:rPr lang="en-US" dirty="0"/>
+              <a:t>You want to clone the GitHub repo to your own local machine</a:t>
+            </a:r>
+          </a:p>
+          <a:p>
+            <a:r>
+              <a:rPr lang="en-US" dirty="0"/>
+              <a:t>In your Terminal/PowerShell (in a new window/tab to keep the </a:t>
+            </a:r>
+            <a:r>
+              <a:rPr lang="en-US" dirty="0" err="1"/>
+              <a:t>ssh</a:t>
+            </a:r>
+            <a:r>
+              <a:rPr lang="en-US" dirty="0"/>
+              <a:t> of linux.cs.pitt.edu still running):</a:t>
+            </a:r>
+          </a:p>
+          <a:p>
+            <a:pPr lvl="1"/>
+            <a:r>
+              <a:rPr lang="en-US" b="1" dirty="0"/>
+              <a:t>git clone https://github.com/maher460/my_xv6.git</a:t>
+            </a:r>
+          </a:p>
+          <a:p>
+            <a:r>
+              <a:rPr lang="en-US" dirty="0"/>
+              <a:t>Now, you can use your </a:t>
+            </a:r>
+            <a:r>
+              <a:rPr lang="en-US" dirty="0" err="1"/>
+              <a:t>favourite</a:t>
+            </a:r>
+            <a:r>
+              <a:rPr lang="en-US" dirty="0"/>
+              <a:t> IDE to code and upload all the changes to your private git:</a:t>
+            </a:r>
+          </a:p>
+          <a:p>
+            <a:pPr lvl="1"/>
+            <a:r>
+              <a:rPr lang="en-US" b="1" dirty="0"/>
+              <a:t>git add –A</a:t>
+            </a:r>
+          </a:p>
+          <a:p>
+            <a:pPr lvl="1"/>
+            <a:r>
+              <a:rPr lang="en-US" b="1" dirty="0"/>
+              <a:t>git commit –m “</a:t>
+            </a:r>
+            <a:r>
+              <a:rPr lang="en-US" dirty="0"/>
+              <a:t>comment about the changes you made</a:t>
+            </a:r>
+            <a:r>
+              <a:rPr lang="en-US" b="1" dirty="0"/>
+              <a:t>”</a:t>
+            </a:r>
+          </a:p>
+          <a:p>
+            <a:pPr lvl="1"/>
+            <a:r>
+              <a:rPr lang="en-US" b="1" dirty="0"/>
+              <a:t>git push</a:t>
+            </a:r>
+          </a:p>
+          <a:p>
+            <a:r>
+              <a:rPr lang="en-US" dirty="0"/>
+              <a:t>Pull all the uploaded changes in the linux.cs.pitt.edu:</a:t>
+            </a:r>
+          </a:p>
+          <a:p>
+            <a:pPr lvl="1"/>
+            <a:r>
+              <a:rPr lang="en-US" b="1" dirty="0"/>
+              <a:t>git pull</a:t>
+            </a:r>
+          </a:p>
+        </p:txBody>
+      </p:sp>
+    </p:spTree>
+    <p:extLst>
+      <p:ext uri="{BB962C8B-B14F-4D97-AF65-F5344CB8AC3E}">
+        <p14:creationId xmlns:p14="http://schemas.microsoft.com/office/powerpoint/2010/main" val="2216177714"/>
+      </p:ext>
+    </p:extLst>
+  </p:cSld>
+  <p:clrMapOvr>
+    <a:masterClrMapping/>
+  </p:clrMapOvr>
+</p:sld>
+</file>
+
+<file path=ppt/slides/slide39.xml><?xml version="1.0" encoding="utf-8"?>
 <p:sld xmlns:a="http://schemas.openxmlformats.org/drawingml/2006/main" xmlns:r="http://schemas.openxmlformats.org/officeDocument/2006/relationships" xmlns:p="http://schemas.openxmlformats.org/presentationml/2006/main">
   <p:cSld>
     <p:spTree>
@@ -13658,7 +13819,303 @@
 </p:sld>
 </file>
 
-<file path=ppt/slides/slide39.xml><?xml version="1.0" encoding="utf-8"?>
+<file path=ppt/slides/slide4.xml><?xml version="1.0" encoding="utf-8"?>
+<p:sld xmlns:a="http://schemas.openxmlformats.org/drawingml/2006/main" xmlns:r="http://schemas.openxmlformats.org/officeDocument/2006/relationships" xmlns:p="http://schemas.openxmlformats.org/presentationml/2006/main">
+  <p:cSld>
+    <p:spTree>
+      <p:nvGrpSpPr>
+        <p:cNvPr id="1" name=""/>
+        <p:cNvGrpSpPr/>
+        <p:nvPr/>
+      </p:nvGrpSpPr>
+      <p:grpSpPr>
+        <a:xfrm>
+          <a:off x="0" y="0"/>
+          <a:ext cx="0" cy="0"/>
+          <a:chOff x="0" y="0"/>
+          <a:chExt cx="0" cy="0"/>
+        </a:xfrm>
+      </p:grpSpPr>
+      <p:sp>
+        <p:nvSpPr>
+          <p:cNvPr id="2" name="Title 1"/>
+          <p:cNvSpPr>
+            <a:spLocks noGrp="1"/>
+          </p:cNvSpPr>
+          <p:nvPr>
+            <p:ph type="title"/>
+          </p:nvPr>
+        </p:nvSpPr>
+        <p:spPr/>
+        <p:txBody>
+          <a:bodyPr/>
+          <a:lstStyle/>
+          <a:p>
+            <a:r>
+              <a:rPr lang="en-US" dirty="0"/>
+              <a:t>CS 1550 – Kernel Space vs User Space </a:t>
+            </a:r>
+          </a:p>
+        </p:txBody>
+      </p:sp>
+      <p:sp>
+        <p:nvSpPr>
+          <p:cNvPr id="3" name="Content Placeholder 2"/>
+          <p:cNvSpPr>
+            <a:spLocks noGrp="1"/>
+          </p:cNvSpPr>
+          <p:nvPr>
+            <p:ph idx="1"/>
+          </p:nvPr>
+        </p:nvSpPr>
+        <p:spPr>
+          <a:xfrm>
+            <a:off x="838200" y="1825626"/>
+            <a:ext cx="10515600" cy="3085041"/>
+          </a:xfrm>
+        </p:spPr>
+        <p:txBody>
+          <a:bodyPr>
+            <a:normAutofit/>
+          </a:bodyPr>
+          <a:lstStyle/>
+          <a:p>
+            <a:r>
+              <a:rPr lang="en-US" dirty="0"/>
+              <a:t>OS manages hardware, services and user processes</a:t>
+            </a:r>
+          </a:p>
+          <a:p>
+            <a:pPr lvl="1"/>
+            <a:r>
+              <a:rPr lang="en-US" dirty="0"/>
+              <a:t>CPU</a:t>
+            </a:r>
+          </a:p>
+          <a:p>
+            <a:pPr lvl="1"/>
+            <a:r>
+              <a:rPr lang="en-US" dirty="0"/>
+              <a:t>Memory (Address space)</a:t>
+            </a:r>
+          </a:p>
+          <a:p>
+            <a:pPr lvl="1"/>
+            <a:r>
+              <a:rPr lang="en-US" dirty="0"/>
+              <a:t>I/O devices (Disk, mouse, video card, sound, network, etc.)</a:t>
+            </a:r>
+          </a:p>
+        </p:txBody>
+      </p:sp>
+      <p:cxnSp>
+        <p:nvCxnSpPr>
+          <p:cNvPr id="5" name="Straight Connector 4"/>
+          <p:cNvCxnSpPr>
+            <a:cxnSpLocks/>
+          </p:cNvCxnSpPr>
+          <p:nvPr/>
+        </p:nvCxnSpPr>
+        <p:spPr>
+          <a:xfrm>
+            <a:off x="944880" y="1295400"/>
+            <a:ext cx="10408920" cy="0"/>
+          </a:xfrm>
+          <a:prstGeom prst="line">
+            <a:avLst/>
+          </a:prstGeom>
+          <a:ln>
+            <a:solidFill>
+              <a:schemeClr val="accent1">
+                <a:lumMod val="75000"/>
+              </a:schemeClr>
+            </a:solidFill>
+          </a:ln>
+        </p:spPr>
+        <p:style>
+          <a:lnRef idx="1">
+            <a:schemeClr val="accent1"/>
+          </a:lnRef>
+          <a:fillRef idx="0">
+            <a:schemeClr val="accent1"/>
+          </a:fillRef>
+          <a:effectRef idx="0">
+            <a:schemeClr val="accent1"/>
+          </a:effectRef>
+          <a:fontRef idx="minor">
+            <a:schemeClr val="tx1"/>
+          </a:fontRef>
+        </p:style>
+      </p:cxnSp>
+      <p:sp>
+        <p:nvSpPr>
+          <p:cNvPr id="7" name="Rectangle 6">
+            <a:extLst>
+              <a:ext uri="{FF2B5EF4-FFF2-40B4-BE49-F238E27FC236}">
+                <a16:creationId xmlns:a16="http://schemas.microsoft.com/office/drawing/2014/main" id="{396D9FDD-874B-413E-81B8-0EF298A692ED}"/>
+              </a:ext>
+            </a:extLst>
+          </p:cNvPr>
+          <p:cNvSpPr/>
+          <p:nvPr/>
+        </p:nvSpPr>
+        <p:spPr>
+          <a:xfrm>
+            <a:off x="4675615" y="4585857"/>
+            <a:ext cx="1986845" cy="680517"/>
+          </a:xfrm>
+          <a:prstGeom prst="rect">
+            <a:avLst/>
+          </a:prstGeom>
+        </p:spPr>
+        <p:style>
+          <a:lnRef idx="2">
+            <a:schemeClr val="accent5">
+              <a:shade val="50000"/>
+            </a:schemeClr>
+          </a:lnRef>
+          <a:fillRef idx="1">
+            <a:schemeClr val="accent5"/>
+          </a:fillRef>
+          <a:effectRef idx="0">
+            <a:schemeClr val="accent5"/>
+          </a:effectRef>
+          <a:fontRef idx="minor">
+            <a:schemeClr val="lt1"/>
+          </a:fontRef>
+        </p:style>
+        <p:txBody>
+          <a:bodyPr rtlCol="0" anchor="ctr"/>
+          <a:lstStyle/>
+          <a:p>
+            <a:pPr algn="ctr"/>
+            <a:r>
+              <a:rPr lang="en-US" b="1" dirty="0">
+                <a:solidFill>
+                  <a:schemeClr val="tx1"/>
+                </a:solidFill>
+              </a:rPr>
+              <a:t>Operating System</a:t>
+            </a:r>
+            <a:endParaRPr lang="en-US" dirty="0">
+              <a:solidFill>
+                <a:schemeClr val="tx1"/>
+              </a:solidFill>
+            </a:endParaRPr>
+          </a:p>
+        </p:txBody>
+      </p:sp>
+      <p:sp>
+        <p:nvSpPr>
+          <p:cNvPr id="11" name="Rectangle 10">
+            <a:extLst>
+              <a:ext uri="{FF2B5EF4-FFF2-40B4-BE49-F238E27FC236}">
+                <a16:creationId xmlns:a16="http://schemas.microsoft.com/office/drawing/2014/main" id="{89A95372-DF38-495A-A55B-CBFC757E4D38}"/>
+              </a:ext>
+            </a:extLst>
+          </p:cNvPr>
+          <p:cNvSpPr/>
+          <p:nvPr/>
+        </p:nvSpPr>
+        <p:spPr>
+          <a:xfrm>
+            <a:off x="4675616" y="5383209"/>
+            <a:ext cx="1986845" cy="680517"/>
+          </a:xfrm>
+          <a:prstGeom prst="rect">
+            <a:avLst/>
+          </a:prstGeom>
+        </p:spPr>
+        <p:style>
+          <a:lnRef idx="2">
+            <a:schemeClr val="accent3">
+              <a:shade val="50000"/>
+            </a:schemeClr>
+          </a:lnRef>
+          <a:fillRef idx="1">
+            <a:schemeClr val="accent3"/>
+          </a:fillRef>
+          <a:effectRef idx="0">
+            <a:schemeClr val="accent3"/>
+          </a:effectRef>
+          <a:fontRef idx="minor">
+            <a:schemeClr val="lt1"/>
+          </a:fontRef>
+        </p:style>
+        <p:txBody>
+          <a:bodyPr rtlCol="0" anchor="ctr"/>
+          <a:lstStyle/>
+          <a:p>
+            <a:pPr algn="ctr"/>
+            <a:r>
+              <a:rPr lang="en-US" b="1" dirty="0">
+                <a:solidFill>
+                  <a:schemeClr val="tx1"/>
+                </a:solidFill>
+              </a:rPr>
+              <a:t>Hardware</a:t>
+            </a:r>
+            <a:endParaRPr lang="en-US" dirty="0">
+              <a:solidFill>
+                <a:schemeClr val="tx1"/>
+              </a:solidFill>
+            </a:endParaRPr>
+          </a:p>
+        </p:txBody>
+      </p:sp>
+      <p:pic>
+        <p:nvPicPr>
+          <p:cNvPr id="6" name="Graphic 5" descr="Gears">
+            <a:extLst>
+              <a:ext uri="{FF2B5EF4-FFF2-40B4-BE49-F238E27FC236}">
+                <a16:creationId xmlns:a16="http://schemas.microsoft.com/office/drawing/2014/main" id="{190A0E06-7FA1-4A6B-BC24-BD8FFD2A2D2C}"/>
+              </a:ext>
+            </a:extLst>
+          </p:cNvPr>
+          <p:cNvPicPr>
+            <a:picLocks noChangeAspect="1"/>
+          </p:cNvPicPr>
+          <p:nvPr/>
+        </p:nvPicPr>
+        <p:blipFill>
+          <a:blip r:embed="rId2">
+            <a:extLst>
+              <a:ext uri="{28A0092B-C50C-407E-A947-70E740481C1C}">
+                <a14:useLocalDpi xmlns:a14="http://schemas.microsoft.com/office/drawing/2010/main" val="0"/>
+              </a:ext>
+              <a:ext uri="{96DAC541-7B7A-43D3-8B79-37D633B846F1}">
+                <asvg:svgBlip xmlns:asvg="http://schemas.microsoft.com/office/drawing/2016/SVG/main" r:embed="rId3"/>
+              </a:ext>
+            </a:extLst>
+          </a:blip>
+          <a:stretch>
+            <a:fillRect/>
+          </a:stretch>
+        </p:blipFill>
+        <p:spPr>
+          <a:xfrm rot="3147322">
+            <a:off x="5234940" y="4882445"/>
+            <a:ext cx="914400" cy="914400"/>
+          </a:xfrm>
+          <a:prstGeom prst="rect">
+            <a:avLst/>
+          </a:prstGeom>
+        </p:spPr>
+      </p:pic>
+    </p:spTree>
+    <p:extLst>
+      <p:ext uri="{BB962C8B-B14F-4D97-AF65-F5344CB8AC3E}">
+        <p14:creationId xmlns:p14="http://schemas.microsoft.com/office/powerpoint/2010/main" val="1208370764"/>
+      </p:ext>
+    </p:extLst>
+  </p:cSld>
+  <p:clrMapOvr>
+    <a:masterClrMapping/>
+  </p:clrMapOvr>
+</p:sld>
+</file>
+
+<file path=ppt/slides/slide40.xml><?xml version="1.0" encoding="utf-8"?>
 <p:sld xmlns:a="http://schemas.openxmlformats.org/drawingml/2006/main" xmlns:r="http://schemas.openxmlformats.org/officeDocument/2006/relationships" xmlns:p="http://schemas.openxmlformats.org/presentationml/2006/main">
   <p:cSld>
     <p:spTree>
@@ -13850,303 +14307,7 @@
 </p:sld>
 </file>
 
-<file path=ppt/slides/slide4.xml><?xml version="1.0" encoding="utf-8"?>
-<p:sld xmlns:a="http://schemas.openxmlformats.org/drawingml/2006/main" xmlns:r="http://schemas.openxmlformats.org/officeDocument/2006/relationships" xmlns:p="http://schemas.openxmlformats.org/presentationml/2006/main">
-  <p:cSld>
-    <p:spTree>
-      <p:nvGrpSpPr>
-        <p:cNvPr id="1" name=""/>
-        <p:cNvGrpSpPr/>
-        <p:nvPr/>
-      </p:nvGrpSpPr>
-      <p:grpSpPr>
-        <a:xfrm>
-          <a:off x="0" y="0"/>
-          <a:ext cx="0" cy="0"/>
-          <a:chOff x="0" y="0"/>
-          <a:chExt cx="0" cy="0"/>
-        </a:xfrm>
-      </p:grpSpPr>
-      <p:sp>
-        <p:nvSpPr>
-          <p:cNvPr id="2" name="Title 1"/>
-          <p:cNvSpPr>
-            <a:spLocks noGrp="1"/>
-          </p:cNvSpPr>
-          <p:nvPr>
-            <p:ph type="title"/>
-          </p:nvPr>
-        </p:nvSpPr>
-        <p:spPr/>
-        <p:txBody>
-          <a:bodyPr/>
-          <a:lstStyle/>
-          <a:p>
-            <a:r>
-              <a:rPr lang="en-US" dirty="0"/>
-              <a:t>CS 1550 – Kernel Space vs User Space </a:t>
-            </a:r>
-          </a:p>
-        </p:txBody>
-      </p:sp>
-      <p:sp>
-        <p:nvSpPr>
-          <p:cNvPr id="3" name="Content Placeholder 2"/>
-          <p:cNvSpPr>
-            <a:spLocks noGrp="1"/>
-          </p:cNvSpPr>
-          <p:nvPr>
-            <p:ph idx="1"/>
-          </p:nvPr>
-        </p:nvSpPr>
-        <p:spPr>
-          <a:xfrm>
-            <a:off x="838200" y="1825626"/>
-            <a:ext cx="10515600" cy="3085041"/>
-          </a:xfrm>
-        </p:spPr>
-        <p:txBody>
-          <a:bodyPr>
-            <a:normAutofit/>
-          </a:bodyPr>
-          <a:lstStyle/>
-          <a:p>
-            <a:r>
-              <a:rPr lang="en-US" dirty="0"/>
-              <a:t>OS manages hardware, services and user processes</a:t>
-            </a:r>
-          </a:p>
-          <a:p>
-            <a:pPr lvl="1"/>
-            <a:r>
-              <a:rPr lang="en-US" dirty="0"/>
-              <a:t>CPU</a:t>
-            </a:r>
-          </a:p>
-          <a:p>
-            <a:pPr lvl="1"/>
-            <a:r>
-              <a:rPr lang="en-US" dirty="0"/>
-              <a:t>Memory (Address space)</a:t>
-            </a:r>
-          </a:p>
-          <a:p>
-            <a:pPr lvl="1"/>
-            <a:r>
-              <a:rPr lang="en-US" dirty="0"/>
-              <a:t>I/O devices (Disk, mouse, video card, sound, network, etc.)</a:t>
-            </a:r>
-          </a:p>
-        </p:txBody>
-      </p:sp>
-      <p:cxnSp>
-        <p:nvCxnSpPr>
-          <p:cNvPr id="5" name="Straight Connector 4"/>
-          <p:cNvCxnSpPr>
-            <a:cxnSpLocks/>
-          </p:cNvCxnSpPr>
-          <p:nvPr/>
-        </p:nvCxnSpPr>
-        <p:spPr>
-          <a:xfrm>
-            <a:off x="944880" y="1295400"/>
-            <a:ext cx="10408920" cy="0"/>
-          </a:xfrm>
-          <a:prstGeom prst="line">
-            <a:avLst/>
-          </a:prstGeom>
-          <a:ln>
-            <a:solidFill>
-              <a:schemeClr val="accent1">
-                <a:lumMod val="75000"/>
-              </a:schemeClr>
-            </a:solidFill>
-          </a:ln>
-        </p:spPr>
-        <p:style>
-          <a:lnRef idx="1">
-            <a:schemeClr val="accent1"/>
-          </a:lnRef>
-          <a:fillRef idx="0">
-            <a:schemeClr val="accent1"/>
-          </a:fillRef>
-          <a:effectRef idx="0">
-            <a:schemeClr val="accent1"/>
-          </a:effectRef>
-          <a:fontRef idx="minor">
-            <a:schemeClr val="tx1"/>
-          </a:fontRef>
-        </p:style>
-      </p:cxnSp>
-      <p:sp>
-        <p:nvSpPr>
-          <p:cNvPr id="7" name="Rectangle 6">
-            <a:extLst>
-              <a:ext uri="{FF2B5EF4-FFF2-40B4-BE49-F238E27FC236}">
-                <a16:creationId xmlns:a16="http://schemas.microsoft.com/office/drawing/2014/main" id="{396D9FDD-874B-413E-81B8-0EF298A692ED}"/>
-              </a:ext>
-            </a:extLst>
-          </p:cNvPr>
-          <p:cNvSpPr/>
-          <p:nvPr/>
-        </p:nvSpPr>
-        <p:spPr>
-          <a:xfrm>
-            <a:off x="4675615" y="4585857"/>
-            <a:ext cx="1986845" cy="680517"/>
-          </a:xfrm>
-          <a:prstGeom prst="rect">
-            <a:avLst/>
-          </a:prstGeom>
-        </p:spPr>
-        <p:style>
-          <a:lnRef idx="2">
-            <a:schemeClr val="accent5">
-              <a:shade val="50000"/>
-            </a:schemeClr>
-          </a:lnRef>
-          <a:fillRef idx="1">
-            <a:schemeClr val="accent5"/>
-          </a:fillRef>
-          <a:effectRef idx="0">
-            <a:schemeClr val="accent5"/>
-          </a:effectRef>
-          <a:fontRef idx="minor">
-            <a:schemeClr val="lt1"/>
-          </a:fontRef>
-        </p:style>
-        <p:txBody>
-          <a:bodyPr rtlCol="0" anchor="ctr"/>
-          <a:lstStyle/>
-          <a:p>
-            <a:pPr algn="ctr"/>
-            <a:r>
-              <a:rPr lang="en-US" b="1" dirty="0">
-                <a:solidFill>
-                  <a:schemeClr val="tx1"/>
-                </a:solidFill>
-              </a:rPr>
-              <a:t>Operating System</a:t>
-            </a:r>
-            <a:endParaRPr lang="en-US" dirty="0">
-              <a:solidFill>
-                <a:schemeClr val="tx1"/>
-              </a:solidFill>
-            </a:endParaRPr>
-          </a:p>
-        </p:txBody>
-      </p:sp>
-      <p:sp>
-        <p:nvSpPr>
-          <p:cNvPr id="11" name="Rectangle 10">
-            <a:extLst>
-              <a:ext uri="{FF2B5EF4-FFF2-40B4-BE49-F238E27FC236}">
-                <a16:creationId xmlns:a16="http://schemas.microsoft.com/office/drawing/2014/main" id="{89A95372-DF38-495A-A55B-CBFC757E4D38}"/>
-              </a:ext>
-            </a:extLst>
-          </p:cNvPr>
-          <p:cNvSpPr/>
-          <p:nvPr/>
-        </p:nvSpPr>
-        <p:spPr>
-          <a:xfrm>
-            <a:off x="4675616" y="5383209"/>
-            <a:ext cx="1986845" cy="680517"/>
-          </a:xfrm>
-          <a:prstGeom prst="rect">
-            <a:avLst/>
-          </a:prstGeom>
-        </p:spPr>
-        <p:style>
-          <a:lnRef idx="2">
-            <a:schemeClr val="accent3">
-              <a:shade val="50000"/>
-            </a:schemeClr>
-          </a:lnRef>
-          <a:fillRef idx="1">
-            <a:schemeClr val="accent3"/>
-          </a:fillRef>
-          <a:effectRef idx="0">
-            <a:schemeClr val="accent3"/>
-          </a:effectRef>
-          <a:fontRef idx="minor">
-            <a:schemeClr val="lt1"/>
-          </a:fontRef>
-        </p:style>
-        <p:txBody>
-          <a:bodyPr rtlCol="0" anchor="ctr"/>
-          <a:lstStyle/>
-          <a:p>
-            <a:pPr algn="ctr"/>
-            <a:r>
-              <a:rPr lang="en-US" b="1" dirty="0">
-                <a:solidFill>
-                  <a:schemeClr val="tx1"/>
-                </a:solidFill>
-              </a:rPr>
-              <a:t>Hardware</a:t>
-            </a:r>
-            <a:endParaRPr lang="en-US" dirty="0">
-              <a:solidFill>
-                <a:schemeClr val="tx1"/>
-              </a:solidFill>
-            </a:endParaRPr>
-          </a:p>
-        </p:txBody>
-      </p:sp>
-      <p:pic>
-        <p:nvPicPr>
-          <p:cNvPr id="6" name="Graphic 5" descr="Gears">
-            <a:extLst>
-              <a:ext uri="{FF2B5EF4-FFF2-40B4-BE49-F238E27FC236}">
-                <a16:creationId xmlns:a16="http://schemas.microsoft.com/office/drawing/2014/main" id="{190A0E06-7FA1-4A6B-BC24-BD8FFD2A2D2C}"/>
-              </a:ext>
-            </a:extLst>
-          </p:cNvPr>
-          <p:cNvPicPr>
-            <a:picLocks noChangeAspect="1"/>
-          </p:cNvPicPr>
-          <p:nvPr/>
-        </p:nvPicPr>
-        <p:blipFill>
-          <a:blip r:embed="rId2">
-            <a:extLst>
-              <a:ext uri="{28A0092B-C50C-407E-A947-70E740481C1C}">
-                <a14:useLocalDpi xmlns:a14="http://schemas.microsoft.com/office/drawing/2010/main" val="0"/>
-              </a:ext>
-              <a:ext uri="{96DAC541-7B7A-43D3-8B79-37D633B846F1}">
-                <asvg:svgBlip xmlns:asvg="http://schemas.microsoft.com/office/drawing/2016/SVG/main" r:embed="rId3"/>
-              </a:ext>
-            </a:extLst>
-          </a:blip>
-          <a:stretch>
-            <a:fillRect/>
-          </a:stretch>
-        </p:blipFill>
-        <p:spPr>
-          <a:xfrm rot="3147322">
-            <a:off x="5234940" y="4882445"/>
-            <a:ext cx="914400" cy="914400"/>
-          </a:xfrm>
-          <a:prstGeom prst="rect">
-            <a:avLst/>
-          </a:prstGeom>
-        </p:spPr>
-      </p:pic>
-    </p:spTree>
-    <p:extLst>
-      <p:ext uri="{BB962C8B-B14F-4D97-AF65-F5344CB8AC3E}">
-        <p14:creationId xmlns:p14="http://schemas.microsoft.com/office/powerpoint/2010/main" val="1208370764"/>
-      </p:ext>
-    </p:extLst>
-  </p:cSld>
-  <p:clrMapOvr>
-    <a:masterClrMapping/>
-  </p:clrMapOvr>
-</p:sld>
-</file>
-
-<file path=ppt/slides/slide40.xml><?xml version="1.0" encoding="utf-8"?>
+<file path=ppt/slides/slide41.xml><?xml version="1.0" encoding="utf-8"?>
 <p:sld xmlns:a="http://schemas.openxmlformats.org/drawingml/2006/main" xmlns:r="http://schemas.openxmlformats.org/officeDocument/2006/relationships" xmlns:p="http://schemas.openxmlformats.org/presentationml/2006/main">
   <p:cSld>
     <p:spTree>
@@ -14347,7 +14508,7 @@
 </p:sld>
 </file>
 
-<file path=ppt/slides/slide41.xml><?xml version="1.0" encoding="utf-8"?>
+<file path=ppt/slides/slide42.xml><?xml version="1.0" encoding="utf-8"?>
 <p:sld xmlns:a="http://schemas.openxmlformats.org/drawingml/2006/main" xmlns:r="http://schemas.openxmlformats.org/officeDocument/2006/relationships" xmlns:p="http://schemas.openxmlformats.org/presentationml/2006/main">
   <p:cSld>
     <p:spTree>
@@ -14539,7 +14700,7 @@
 </p:sld>
 </file>
 
-<file path=ppt/slides/slide42.xml><?xml version="1.0" encoding="utf-8"?>
+<file path=ppt/slides/slide43.xml><?xml version="1.0" encoding="utf-8"?>
 <p:sld xmlns:a="http://schemas.openxmlformats.org/drawingml/2006/main" xmlns:r="http://schemas.openxmlformats.org/officeDocument/2006/relationships" xmlns:p="http://schemas.openxmlformats.org/presentationml/2006/main">
   <p:cSld>
     <p:spTree>
@@ -14706,7 +14867,7 @@
 </p:sld>
 </file>
 
-<file path=ppt/slides/slide43.xml><?xml version="1.0" encoding="utf-8"?>
+<file path=ppt/slides/slide44.xml><?xml version="1.0" encoding="utf-8"?>
 <p:sld xmlns:a="http://schemas.openxmlformats.org/drawingml/2006/main" xmlns:r="http://schemas.openxmlformats.org/officeDocument/2006/relationships" xmlns:p="http://schemas.openxmlformats.org/presentationml/2006/main">
   <p:cSld>
     <p:spTree>
@@ -14873,7 +15034,7 @@
 </p:sld>
 </file>
 
-<file path=ppt/slides/slide44.xml><?xml version="1.0" encoding="utf-8"?>
+<file path=ppt/slides/slide45.xml><?xml version="1.0" encoding="utf-8"?>
 <p:sld xmlns:a="http://schemas.openxmlformats.org/drawingml/2006/main" xmlns:r="http://schemas.openxmlformats.org/officeDocument/2006/relationships" xmlns:p="http://schemas.openxmlformats.org/presentationml/2006/main">
   <p:cSld>
     <p:spTree>
@@ -15070,7 +15231,7 @@
 </p:sld>
 </file>
 
-<file path=ppt/slides/slide45.xml><?xml version="1.0" encoding="utf-8"?>
+<file path=ppt/slides/slide46.xml><?xml version="1.0" encoding="utf-8"?>
 <p:sld xmlns:a="http://schemas.openxmlformats.org/drawingml/2006/main" xmlns:r="http://schemas.openxmlformats.org/officeDocument/2006/relationships" xmlns:p="http://schemas.openxmlformats.org/presentationml/2006/main">
   <p:cSld>
     <p:spTree>
@@ -15335,7 +15496,7 @@
 </p:sld>
 </file>
 
-<file path=ppt/slides/slide46.xml><?xml version="1.0" encoding="utf-8"?>
+<file path=ppt/slides/slide47.xml><?xml version="1.0" encoding="utf-8"?>
 <p:sld xmlns:a="http://schemas.openxmlformats.org/drawingml/2006/main" xmlns:r="http://schemas.openxmlformats.org/officeDocument/2006/relationships" xmlns:p="http://schemas.openxmlformats.org/presentationml/2006/main">
   <p:cSld>
     <p:spTree>
@@ -15530,7 +15691,7 @@
 </p:sld>
 </file>
 
-<file path=ppt/slides/slide47.xml><?xml version="1.0" encoding="utf-8"?>
+<file path=ppt/slides/slide48.xml><?xml version="1.0" encoding="utf-8"?>
 <p:sld xmlns:a="http://schemas.openxmlformats.org/drawingml/2006/main" xmlns:r="http://schemas.openxmlformats.org/officeDocument/2006/relationships" xmlns:p="http://schemas.openxmlformats.org/presentationml/2006/main">
   <p:cSld>
     <p:spTree>
@@ -15720,7 +15881,7 @@
 </p:sld>
 </file>
 
-<file path=ppt/slides/slide48.xml><?xml version="1.0" encoding="utf-8"?>
+<file path=ppt/slides/slide49.xml><?xml version="1.0" encoding="utf-8"?>
 <p:sld xmlns:a="http://schemas.openxmlformats.org/drawingml/2006/main" xmlns:r="http://schemas.openxmlformats.org/officeDocument/2006/relationships" xmlns:p="http://schemas.openxmlformats.org/presentationml/2006/main">
   <p:cSld>
     <p:spTree>
@@ -15980,7 +16141,400 @@
 </p:sld>
 </file>
 
-<file path=ppt/slides/slide49.xml><?xml version="1.0" encoding="utf-8"?>
+<file path=ppt/slides/slide5.xml><?xml version="1.0" encoding="utf-8"?>
+<p:sld xmlns:a="http://schemas.openxmlformats.org/drawingml/2006/main" xmlns:r="http://schemas.openxmlformats.org/officeDocument/2006/relationships" xmlns:p="http://schemas.openxmlformats.org/presentationml/2006/main">
+  <p:cSld>
+    <p:spTree>
+      <p:nvGrpSpPr>
+        <p:cNvPr id="1" name=""/>
+        <p:cNvGrpSpPr/>
+        <p:nvPr/>
+      </p:nvGrpSpPr>
+      <p:grpSpPr>
+        <a:xfrm>
+          <a:off x="0" y="0"/>
+          <a:ext cx="0" cy="0"/>
+          <a:chOff x="0" y="0"/>
+          <a:chExt cx="0" cy="0"/>
+        </a:xfrm>
+      </p:grpSpPr>
+      <p:sp>
+        <p:nvSpPr>
+          <p:cNvPr id="2" name="Title 1"/>
+          <p:cNvSpPr>
+            <a:spLocks noGrp="1"/>
+          </p:cNvSpPr>
+          <p:nvPr>
+            <p:ph type="title"/>
+          </p:nvPr>
+        </p:nvSpPr>
+        <p:spPr/>
+        <p:txBody>
+          <a:bodyPr/>
+          <a:lstStyle/>
+          <a:p>
+            <a:r>
+              <a:rPr lang="en-US" dirty="0"/>
+              <a:t>CS 1550 – Kernel Space vs User Space </a:t>
+            </a:r>
+          </a:p>
+        </p:txBody>
+      </p:sp>
+      <p:sp>
+        <p:nvSpPr>
+          <p:cNvPr id="3" name="Content Placeholder 2"/>
+          <p:cNvSpPr>
+            <a:spLocks noGrp="1"/>
+          </p:cNvSpPr>
+          <p:nvPr>
+            <p:ph idx="1"/>
+          </p:nvPr>
+        </p:nvSpPr>
+        <p:spPr>
+          <a:xfrm>
+            <a:off x="838200" y="1825626"/>
+            <a:ext cx="10515600" cy="1922285"/>
+          </a:xfrm>
+        </p:spPr>
+        <p:txBody>
+          <a:bodyPr>
+            <a:normAutofit/>
+          </a:bodyPr>
+          <a:lstStyle/>
+          <a:p>
+            <a:r>
+              <a:rPr lang="en-US" dirty="0"/>
+              <a:t>OS manages hardware, services and user processes</a:t>
+            </a:r>
+          </a:p>
+          <a:p>
+            <a:pPr lvl="1"/>
+            <a:r>
+              <a:rPr lang="en-US" dirty="0"/>
+              <a:t>CPU</a:t>
+            </a:r>
+          </a:p>
+          <a:p>
+            <a:pPr lvl="1"/>
+            <a:r>
+              <a:rPr lang="en-US" dirty="0"/>
+              <a:t>Memory (Address space)</a:t>
+            </a:r>
+          </a:p>
+          <a:p>
+            <a:pPr lvl="1"/>
+            <a:r>
+              <a:rPr lang="en-US" dirty="0"/>
+              <a:t>I/O devices (Disk, mouse, video card, sound, network, etc.)</a:t>
+            </a:r>
+          </a:p>
+        </p:txBody>
+      </p:sp>
+      <p:cxnSp>
+        <p:nvCxnSpPr>
+          <p:cNvPr id="5" name="Straight Connector 4"/>
+          <p:cNvCxnSpPr>
+            <a:cxnSpLocks/>
+          </p:cNvCxnSpPr>
+          <p:nvPr/>
+        </p:nvCxnSpPr>
+        <p:spPr>
+          <a:xfrm>
+            <a:off x="944880" y="1295400"/>
+            <a:ext cx="10408920" cy="0"/>
+          </a:xfrm>
+          <a:prstGeom prst="line">
+            <a:avLst/>
+          </a:prstGeom>
+          <a:ln>
+            <a:solidFill>
+              <a:schemeClr val="accent1">
+                <a:lumMod val="75000"/>
+              </a:schemeClr>
+            </a:solidFill>
+          </a:ln>
+        </p:spPr>
+        <p:style>
+          <a:lnRef idx="1">
+            <a:schemeClr val="accent1"/>
+          </a:lnRef>
+          <a:fillRef idx="0">
+            <a:schemeClr val="accent1"/>
+          </a:fillRef>
+          <a:effectRef idx="0">
+            <a:schemeClr val="accent1"/>
+          </a:effectRef>
+          <a:fontRef idx="minor">
+            <a:schemeClr val="tx1"/>
+          </a:fontRef>
+        </p:style>
+      </p:cxnSp>
+      <p:sp>
+        <p:nvSpPr>
+          <p:cNvPr id="7" name="Rectangle 6">
+            <a:extLst>
+              <a:ext uri="{FF2B5EF4-FFF2-40B4-BE49-F238E27FC236}">
+                <a16:creationId xmlns:a16="http://schemas.microsoft.com/office/drawing/2014/main" id="{396D9FDD-874B-413E-81B8-0EF298A692ED}"/>
+              </a:ext>
+            </a:extLst>
+          </p:cNvPr>
+          <p:cNvSpPr/>
+          <p:nvPr/>
+        </p:nvSpPr>
+        <p:spPr>
+          <a:xfrm>
+            <a:off x="4641748" y="5015006"/>
+            <a:ext cx="1986845" cy="680517"/>
+          </a:xfrm>
+          <a:prstGeom prst="rect">
+            <a:avLst/>
+          </a:prstGeom>
+        </p:spPr>
+        <p:style>
+          <a:lnRef idx="2">
+            <a:schemeClr val="accent5">
+              <a:shade val="50000"/>
+            </a:schemeClr>
+          </a:lnRef>
+          <a:fillRef idx="1">
+            <a:schemeClr val="accent5"/>
+          </a:fillRef>
+          <a:effectRef idx="0">
+            <a:schemeClr val="accent5"/>
+          </a:effectRef>
+          <a:fontRef idx="minor">
+            <a:schemeClr val="lt1"/>
+          </a:fontRef>
+        </p:style>
+        <p:txBody>
+          <a:bodyPr rtlCol="0" anchor="ctr"/>
+          <a:lstStyle/>
+          <a:p>
+            <a:pPr algn="ctr"/>
+            <a:r>
+              <a:rPr lang="en-US" b="1" dirty="0">
+                <a:solidFill>
+                  <a:schemeClr val="tx1"/>
+                </a:solidFill>
+              </a:rPr>
+              <a:t>Operating System</a:t>
+            </a:r>
+            <a:endParaRPr lang="en-US" dirty="0">
+              <a:solidFill>
+                <a:schemeClr val="tx1"/>
+              </a:solidFill>
+            </a:endParaRPr>
+          </a:p>
+        </p:txBody>
+      </p:sp>
+      <p:sp>
+        <p:nvSpPr>
+          <p:cNvPr id="11" name="Rectangle 10">
+            <a:extLst>
+              <a:ext uri="{FF2B5EF4-FFF2-40B4-BE49-F238E27FC236}">
+                <a16:creationId xmlns:a16="http://schemas.microsoft.com/office/drawing/2014/main" id="{89A95372-DF38-495A-A55B-CBFC757E4D38}"/>
+              </a:ext>
+            </a:extLst>
+          </p:cNvPr>
+          <p:cNvSpPr/>
+          <p:nvPr/>
+        </p:nvSpPr>
+        <p:spPr>
+          <a:xfrm>
+            <a:off x="4641749" y="5812358"/>
+            <a:ext cx="1986845" cy="680517"/>
+          </a:xfrm>
+          <a:prstGeom prst="rect">
+            <a:avLst/>
+          </a:prstGeom>
+        </p:spPr>
+        <p:style>
+          <a:lnRef idx="2">
+            <a:schemeClr val="accent3">
+              <a:shade val="50000"/>
+            </a:schemeClr>
+          </a:lnRef>
+          <a:fillRef idx="1">
+            <a:schemeClr val="accent3"/>
+          </a:fillRef>
+          <a:effectRef idx="0">
+            <a:schemeClr val="accent3"/>
+          </a:effectRef>
+          <a:fontRef idx="minor">
+            <a:schemeClr val="lt1"/>
+          </a:fontRef>
+        </p:style>
+        <p:txBody>
+          <a:bodyPr rtlCol="0" anchor="ctr"/>
+          <a:lstStyle/>
+          <a:p>
+            <a:pPr algn="ctr"/>
+            <a:r>
+              <a:rPr lang="en-US" b="1" dirty="0">
+                <a:solidFill>
+                  <a:schemeClr val="tx1"/>
+                </a:solidFill>
+              </a:rPr>
+              <a:t>Hardware</a:t>
+            </a:r>
+            <a:endParaRPr lang="en-US" dirty="0">
+              <a:solidFill>
+                <a:schemeClr val="tx1"/>
+              </a:solidFill>
+            </a:endParaRPr>
+          </a:p>
+        </p:txBody>
+      </p:sp>
+      <p:pic>
+        <p:nvPicPr>
+          <p:cNvPr id="6" name="Graphic 5" descr="Gears">
+            <a:extLst>
+              <a:ext uri="{FF2B5EF4-FFF2-40B4-BE49-F238E27FC236}">
+                <a16:creationId xmlns:a16="http://schemas.microsoft.com/office/drawing/2014/main" id="{190A0E06-7FA1-4A6B-BC24-BD8FFD2A2D2C}"/>
+              </a:ext>
+            </a:extLst>
+          </p:cNvPr>
+          <p:cNvPicPr>
+            <a:picLocks noChangeAspect="1"/>
+          </p:cNvPicPr>
+          <p:nvPr/>
+        </p:nvPicPr>
+        <p:blipFill>
+          <a:blip r:embed="rId2">
+            <a:extLst>
+              <a:ext uri="{28A0092B-C50C-407E-A947-70E740481C1C}">
+                <a14:useLocalDpi xmlns:a14="http://schemas.microsoft.com/office/drawing/2010/main" val="0"/>
+              </a:ext>
+              <a:ext uri="{96DAC541-7B7A-43D3-8B79-37D633B846F1}">
+                <asvg:svgBlip xmlns:asvg="http://schemas.microsoft.com/office/drawing/2016/SVG/main" r:embed="rId3"/>
+              </a:ext>
+            </a:extLst>
+          </a:blip>
+          <a:stretch>
+            <a:fillRect/>
+          </a:stretch>
+        </p:blipFill>
+        <p:spPr>
+          <a:xfrm rot="3147322">
+            <a:off x="5201073" y="5311594"/>
+            <a:ext cx="914400" cy="914400"/>
+          </a:xfrm>
+          <a:prstGeom prst="rect">
+            <a:avLst/>
+          </a:prstGeom>
+        </p:spPr>
+      </p:pic>
+      <p:sp>
+        <p:nvSpPr>
+          <p:cNvPr id="9" name="Rectangle 8">
+            <a:extLst>
+              <a:ext uri="{FF2B5EF4-FFF2-40B4-BE49-F238E27FC236}">
+                <a16:creationId xmlns:a16="http://schemas.microsoft.com/office/drawing/2014/main" id="{D9D2BCAB-C1CD-4575-B8FA-440713506C33}"/>
+              </a:ext>
+            </a:extLst>
+          </p:cNvPr>
+          <p:cNvSpPr/>
+          <p:nvPr/>
+        </p:nvSpPr>
+        <p:spPr>
+          <a:xfrm>
+            <a:off x="4641747" y="4119397"/>
+            <a:ext cx="1986845" cy="680517"/>
+          </a:xfrm>
+          <a:prstGeom prst="rect">
+            <a:avLst/>
+          </a:prstGeom>
+        </p:spPr>
+        <p:style>
+          <a:lnRef idx="2">
+            <a:schemeClr val="accent2">
+              <a:shade val="50000"/>
+            </a:schemeClr>
+          </a:lnRef>
+          <a:fillRef idx="1">
+            <a:schemeClr val="accent2"/>
+          </a:fillRef>
+          <a:effectRef idx="0">
+            <a:schemeClr val="accent2"/>
+          </a:effectRef>
+          <a:fontRef idx="minor">
+            <a:schemeClr val="lt1"/>
+          </a:fontRef>
+        </p:style>
+        <p:txBody>
+          <a:bodyPr rtlCol="0" anchor="ctr"/>
+          <a:lstStyle/>
+          <a:p>
+            <a:pPr algn="ctr"/>
+            <a:r>
+              <a:rPr lang="en-US" b="1" dirty="0">
+                <a:solidFill>
+                  <a:schemeClr val="tx1"/>
+                </a:solidFill>
+              </a:rPr>
+              <a:t>User program</a:t>
+            </a:r>
+            <a:endParaRPr lang="en-US" dirty="0">
+              <a:solidFill>
+                <a:schemeClr val="tx1"/>
+              </a:solidFill>
+            </a:endParaRPr>
+          </a:p>
+        </p:txBody>
+      </p:sp>
+      <p:pic>
+        <p:nvPicPr>
+          <p:cNvPr id="10" name="Graphic 9" descr="Gears">
+            <a:extLst>
+              <a:ext uri="{FF2B5EF4-FFF2-40B4-BE49-F238E27FC236}">
+                <a16:creationId xmlns:a16="http://schemas.microsoft.com/office/drawing/2014/main" id="{D8EA2625-0BB6-485A-A0BC-13AE5511202A}"/>
+              </a:ext>
+            </a:extLst>
+          </p:cNvPr>
+          <p:cNvPicPr>
+            <a:picLocks noChangeAspect="1"/>
+          </p:cNvPicPr>
+          <p:nvPr/>
+        </p:nvPicPr>
+        <p:blipFill>
+          <a:blip r:embed="rId2">
+            <a:extLst>
+              <a:ext uri="{28A0092B-C50C-407E-A947-70E740481C1C}">
+                <a14:useLocalDpi xmlns:a14="http://schemas.microsoft.com/office/drawing/2010/main" val="0"/>
+              </a:ext>
+              <a:ext uri="{96DAC541-7B7A-43D3-8B79-37D633B846F1}">
+                <asvg:svgBlip xmlns:asvg="http://schemas.microsoft.com/office/drawing/2016/SVG/main" r:embed="rId3"/>
+              </a:ext>
+            </a:extLst>
+          </a:blip>
+          <a:stretch>
+            <a:fillRect/>
+          </a:stretch>
+        </p:blipFill>
+        <p:spPr>
+          <a:xfrm rot="3147322">
+            <a:off x="5177968" y="4474838"/>
+            <a:ext cx="914400" cy="914400"/>
+          </a:xfrm>
+          <a:prstGeom prst="rect">
+            <a:avLst/>
+          </a:prstGeom>
+        </p:spPr>
+      </p:pic>
+    </p:spTree>
+    <p:extLst>
+      <p:ext uri="{BB962C8B-B14F-4D97-AF65-F5344CB8AC3E}">
+        <p14:creationId xmlns:p14="http://schemas.microsoft.com/office/powerpoint/2010/main" val="718913804"/>
+      </p:ext>
+    </p:extLst>
+  </p:cSld>
+  <p:clrMapOvr>
+    <a:masterClrMapping/>
+  </p:clrMapOvr>
+</p:sld>
+</file>
+
+<file path=ppt/slides/slide50.xml><?xml version="1.0" encoding="utf-8"?>
 <p:sld xmlns:a="http://schemas.openxmlformats.org/drawingml/2006/main" xmlns:r="http://schemas.openxmlformats.org/officeDocument/2006/relationships" xmlns:p="http://schemas.openxmlformats.org/presentationml/2006/main">
   <p:cSld>
     <p:spTree>
@@ -16219,400 +16773,7 @@
 </p:sld>
 </file>
 
-<file path=ppt/slides/slide5.xml><?xml version="1.0" encoding="utf-8"?>
-<p:sld xmlns:a="http://schemas.openxmlformats.org/drawingml/2006/main" xmlns:r="http://schemas.openxmlformats.org/officeDocument/2006/relationships" xmlns:p="http://schemas.openxmlformats.org/presentationml/2006/main">
-  <p:cSld>
-    <p:spTree>
-      <p:nvGrpSpPr>
-        <p:cNvPr id="1" name=""/>
-        <p:cNvGrpSpPr/>
-        <p:nvPr/>
-      </p:nvGrpSpPr>
-      <p:grpSpPr>
-        <a:xfrm>
-          <a:off x="0" y="0"/>
-          <a:ext cx="0" cy="0"/>
-          <a:chOff x="0" y="0"/>
-          <a:chExt cx="0" cy="0"/>
-        </a:xfrm>
-      </p:grpSpPr>
-      <p:sp>
-        <p:nvSpPr>
-          <p:cNvPr id="2" name="Title 1"/>
-          <p:cNvSpPr>
-            <a:spLocks noGrp="1"/>
-          </p:cNvSpPr>
-          <p:nvPr>
-            <p:ph type="title"/>
-          </p:nvPr>
-        </p:nvSpPr>
-        <p:spPr/>
-        <p:txBody>
-          <a:bodyPr/>
-          <a:lstStyle/>
-          <a:p>
-            <a:r>
-              <a:rPr lang="en-US" dirty="0"/>
-              <a:t>CS 1550 – Kernel Space vs User Space </a:t>
-            </a:r>
-          </a:p>
-        </p:txBody>
-      </p:sp>
-      <p:sp>
-        <p:nvSpPr>
-          <p:cNvPr id="3" name="Content Placeholder 2"/>
-          <p:cNvSpPr>
-            <a:spLocks noGrp="1"/>
-          </p:cNvSpPr>
-          <p:nvPr>
-            <p:ph idx="1"/>
-          </p:nvPr>
-        </p:nvSpPr>
-        <p:spPr>
-          <a:xfrm>
-            <a:off x="838200" y="1825626"/>
-            <a:ext cx="10515600" cy="1922285"/>
-          </a:xfrm>
-        </p:spPr>
-        <p:txBody>
-          <a:bodyPr>
-            <a:normAutofit/>
-          </a:bodyPr>
-          <a:lstStyle/>
-          <a:p>
-            <a:r>
-              <a:rPr lang="en-US" dirty="0"/>
-              <a:t>OS manages hardware, services and user processes</a:t>
-            </a:r>
-          </a:p>
-          <a:p>
-            <a:pPr lvl="1"/>
-            <a:r>
-              <a:rPr lang="en-US" dirty="0"/>
-              <a:t>CPU</a:t>
-            </a:r>
-          </a:p>
-          <a:p>
-            <a:pPr lvl="1"/>
-            <a:r>
-              <a:rPr lang="en-US" dirty="0"/>
-              <a:t>Memory (Address space)</a:t>
-            </a:r>
-          </a:p>
-          <a:p>
-            <a:pPr lvl="1"/>
-            <a:r>
-              <a:rPr lang="en-US" dirty="0"/>
-              <a:t>I/O devices (Disk, mouse, video card, sound, network, etc.)</a:t>
-            </a:r>
-          </a:p>
-        </p:txBody>
-      </p:sp>
-      <p:cxnSp>
-        <p:nvCxnSpPr>
-          <p:cNvPr id="5" name="Straight Connector 4"/>
-          <p:cNvCxnSpPr>
-            <a:cxnSpLocks/>
-          </p:cNvCxnSpPr>
-          <p:nvPr/>
-        </p:nvCxnSpPr>
-        <p:spPr>
-          <a:xfrm>
-            <a:off x="944880" y="1295400"/>
-            <a:ext cx="10408920" cy="0"/>
-          </a:xfrm>
-          <a:prstGeom prst="line">
-            <a:avLst/>
-          </a:prstGeom>
-          <a:ln>
-            <a:solidFill>
-              <a:schemeClr val="accent1">
-                <a:lumMod val="75000"/>
-              </a:schemeClr>
-            </a:solidFill>
-          </a:ln>
-        </p:spPr>
-        <p:style>
-          <a:lnRef idx="1">
-            <a:schemeClr val="accent1"/>
-          </a:lnRef>
-          <a:fillRef idx="0">
-            <a:schemeClr val="accent1"/>
-          </a:fillRef>
-          <a:effectRef idx="0">
-            <a:schemeClr val="accent1"/>
-          </a:effectRef>
-          <a:fontRef idx="minor">
-            <a:schemeClr val="tx1"/>
-          </a:fontRef>
-        </p:style>
-      </p:cxnSp>
-      <p:sp>
-        <p:nvSpPr>
-          <p:cNvPr id="7" name="Rectangle 6">
-            <a:extLst>
-              <a:ext uri="{FF2B5EF4-FFF2-40B4-BE49-F238E27FC236}">
-                <a16:creationId xmlns:a16="http://schemas.microsoft.com/office/drawing/2014/main" id="{396D9FDD-874B-413E-81B8-0EF298A692ED}"/>
-              </a:ext>
-            </a:extLst>
-          </p:cNvPr>
-          <p:cNvSpPr/>
-          <p:nvPr/>
-        </p:nvSpPr>
-        <p:spPr>
-          <a:xfrm>
-            <a:off x="4641748" y="5015006"/>
-            <a:ext cx="1986845" cy="680517"/>
-          </a:xfrm>
-          <a:prstGeom prst="rect">
-            <a:avLst/>
-          </a:prstGeom>
-        </p:spPr>
-        <p:style>
-          <a:lnRef idx="2">
-            <a:schemeClr val="accent5">
-              <a:shade val="50000"/>
-            </a:schemeClr>
-          </a:lnRef>
-          <a:fillRef idx="1">
-            <a:schemeClr val="accent5"/>
-          </a:fillRef>
-          <a:effectRef idx="0">
-            <a:schemeClr val="accent5"/>
-          </a:effectRef>
-          <a:fontRef idx="minor">
-            <a:schemeClr val="lt1"/>
-          </a:fontRef>
-        </p:style>
-        <p:txBody>
-          <a:bodyPr rtlCol="0" anchor="ctr"/>
-          <a:lstStyle/>
-          <a:p>
-            <a:pPr algn="ctr"/>
-            <a:r>
-              <a:rPr lang="en-US" b="1" dirty="0">
-                <a:solidFill>
-                  <a:schemeClr val="tx1"/>
-                </a:solidFill>
-              </a:rPr>
-              <a:t>Operating System</a:t>
-            </a:r>
-            <a:endParaRPr lang="en-US" dirty="0">
-              <a:solidFill>
-                <a:schemeClr val="tx1"/>
-              </a:solidFill>
-            </a:endParaRPr>
-          </a:p>
-        </p:txBody>
-      </p:sp>
-      <p:sp>
-        <p:nvSpPr>
-          <p:cNvPr id="11" name="Rectangle 10">
-            <a:extLst>
-              <a:ext uri="{FF2B5EF4-FFF2-40B4-BE49-F238E27FC236}">
-                <a16:creationId xmlns:a16="http://schemas.microsoft.com/office/drawing/2014/main" id="{89A95372-DF38-495A-A55B-CBFC757E4D38}"/>
-              </a:ext>
-            </a:extLst>
-          </p:cNvPr>
-          <p:cNvSpPr/>
-          <p:nvPr/>
-        </p:nvSpPr>
-        <p:spPr>
-          <a:xfrm>
-            <a:off x="4641749" y="5812358"/>
-            <a:ext cx="1986845" cy="680517"/>
-          </a:xfrm>
-          <a:prstGeom prst="rect">
-            <a:avLst/>
-          </a:prstGeom>
-        </p:spPr>
-        <p:style>
-          <a:lnRef idx="2">
-            <a:schemeClr val="accent3">
-              <a:shade val="50000"/>
-            </a:schemeClr>
-          </a:lnRef>
-          <a:fillRef idx="1">
-            <a:schemeClr val="accent3"/>
-          </a:fillRef>
-          <a:effectRef idx="0">
-            <a:schemeClr val="accent3"/>
-          </a:effectRef>
-          <a:fontRef idx="minor">
-            <a:schemeClr val="lt1"/>
-          </a:fontRef>
-        </p:style>
-        <p:txBody>
-          <a:bodyPr rtlCol="0" anchor="ctr"/>
-          <a:lstStyle/>
-          <a:p>
-            <a:pPr algn="ctr"/>
-            <a:r>
-              <a:rPr lang="en-US" b="1" dirty="0">
-                <a:solidFill>
-                  <a:schemeClr val="tx1"/>
-                </a:solidFill>
-              </a:rPr>
-              <a:t>Hardware</a:t>
-            </a:r>
-            <a:endParaRPr lang="en-US" dirty="0">
-              <a:solidFill>
-                <a:schemeClr val="tx1"/>
-              </a:solidFill>
-            </a:endParaRPr>
-          </a:p>
-        </p:txBody>
-      </p:sp>
-      <p:pic>
-        <p:nvPicPr>
-          <p:cNvPr id="6" name="Graphic 5" descr="Gears">
-            <a:extLst>
-              <a:ext uri="{FF2B5EF4-FFF2-40B4-BE49-F238E27FC236}">
-                <a16:creationId xmlns:a16="http://schemas.microsoft.com/office/drawing/2014/main" id="{190A0E06-7FA1-4A6B-BC24-BD8FFD2A2D2C}"/>
-              </a:ext>
-            </a:extLst>
-          </p:cNvPr>
-          <p:cNvPicPr>
-            <a:picLocks noChangeAspect="1"/>
-          </p:cNvPicPr>
-          <p:nvPr/>
-        </p:nvPicPr>
-        <p:blipFill>
-          <a:blip r:embed="rId2">
-            <a:extLst>
-              <a:ext uri="{28A0092B-C50C-407E-A947-70E740481C1C}">
-                <a14:useLocalDpi xmlns:a14="http://schemas.microsoft.com/office/drawing/2010/main" val="0"/>
-              </a:ext>
-              <a:ext uri="{96DAC541-7B7A-43D3-8B79-37D633B846F1}">
-                <asvg:svgBlip xmlns:asvg="http://schemas.microsoft.com/office/drawing/2016/SVG/main" r:embed="rId3"/>
-              </a:ext>
-            </a:extLst>
-          </a:blip>
-          <a:stretch>
-            <a:fillRect/>
-          </a:stretch>
-        </p:blipFill>
-        <p:spPr>
-          <a:xfrm rot="3147322">
-            <a:off x="5201073" y="5311594"/>
-            <a:ext cx="914400" cy="914400"/>
-          </a:xfrm>
-          <a:prstGeom prst="rect">
-            <a:avLst/>
-          </a:prstGeom>
-        </p:spPr>
-      </p:pic>
-      <p:sp>
-        <p:nvSpPr>
-          <p:cNvPr id="9" name="Rectangle 8">
-            <a:extLst>
-              <a:ext uri="{FF2B5EF4-FFF2-40B4-BE49-F238E27FC236}">
-                <a16:creationId xmlns:a16="http://schemas.microsoft.com/office/drawing/2014/main" id="{D9D2BCAB-C1CD-4575-B8FA-440713506C33}"/>
-              </a:ext>
-            </a:extLst>
-          </p:cNvPr>
-          <p:cNvSpPr/>
-          <p:nvPr/>
-        </p:nvSpPr>
-        <p:spPr>
-          <a:xfrm>
-            <a:off x="4641747" y="4119397"/>
-            <a:ext cx="1986845" cy="680517"/>
-          </a:xfrm>
-          <a:prstGeom prst="rect">
-            <a:avLst/>
-          </a:prstGeom>
-        </p:spPr>
-        <p:style>
-          <a:lnRef idx="2">
-            <a:schemeClr val="accent2">
-              <a:shade val="50000"/>
-            </a:schemeClr>
-          </a:lnRef>
-          <a:fillRef idx="1">
-            <a:schemeClr val="accent2"/>
-          </a:fillRef>
-          <a:effectRef idx="0">
-            <a:schemeClr val="accent2"/>
-          </a:effectRef>
-          <a:fontRef idx="minor">
-            <a:schemeClr val="lt1"/>
-          </a:fontRef>
-        </p:style>
-        <p:txBody>
-          <a:bodyPr rtlCol="0" anchor="ctr"/>
-          <a:lstStyle/>
-          <a:p>
-            <a:pPr algn="ctr"/>
-            <a:r>
-              <a:rPr lang="en-US" b="1" dirty="0">
-                <a:solidFill>
-                  <a:schemeClr val="tx1"/>
-                </a:solidFill>
-              </a:rPr>
-              <a:t>User program</a:t>
-            </a:r>
-            <a:endParaRPr lang="en-US" dirty="0">
-              <a:solidFill>
-                <a:schemeClr val="tx1"/>
-              </a:solidFill>
-            </a:endParaRPr>
-          </a:p>
-        </p:txBody>
-      </p:sp>
-      <p:pic>
-        <p:nvPicPr>
-          <p:cNvPr id="10" name="Graphic 9" descr="Gears">
-            <a:extLst>
-              <a:ext uri="{FF2B5EF4-FFF2-40B4-BE49-F238E27FC236}">
-                <a16:creationId xmlns:a16="http://schemas.microsoft.com/office/drawing/2014/main" id="{D8EA2625-0BB6-485A-A0BC-13AE5511202A}"/>
-              </a:ext>
-            </a:extLst>
-          </p:cNvPr>
-          <p:cNvPicPr>
-            <a:picLocks noChangeAspect="1"/>
-          </p:cNvPicPr>
-          <p:nvPr/>
-        </p:nvPicPr>
-        <p:blipFill>
-          <a:blip r:embed="rId2">
-            <a:extLst>
-              <a:ext uri="{28A0092B-C50C-407E-A947-70E740481C1C}">
-                <a14:useLocalDpi xmlns:a14="http://schemas.microsoft.com/office/drawing/2010/main" val="0"/>
-              </a:ext>
-              <a:ext uri="{96DAC541-7B7A-43D3-8B79-37D633B846F1}">
-                <asvg:svgBlip xmlns:asvg="http://schemas.microsoft.com/office/drawing/2016/SVG/main" r:embed="rId3"/>
-              </a:ext>
-            </a:extLst>
-          </a:blip>
-          <a:stretch>
-            <a:fillRect/>
-          </a:stretch>
-        </p:blipFill>
-        <p:spPr>
-          <a:xfrm rot="3147322">
-            <a:off x="5177968" y="4474838"/>
-            <a:ext cx="914400" cy="914400"/>
-          </a:xfrm>
-          <a:prstGeom prst="rect">
-            <a:avLst/>
-          </a:prstGeom>
-        </p:spPr>
-      </p:pic>
-    </p:spTree>
-    <p:extLst>
-      <p:ext uri="{BB962C8B-B14F-4D97-AF65-F5344CB8AC3E}">
-        <p14:creationId xmlns:p14="http://schemas.microsoft.com/office/powerpoint/2010/main" val="718913804"/>
-      </p:ext>
-    </p:extLst>
-  </p:cSld>
-  <p:clrMapOvr>
-    <a:masterClrMapping/>
-  </p:clrMapOvr>
-</p:sld>
-</file>
-
-<file path=ppt/slides/slide50.xml><?xml version="1.0" encoding="utf-8"?>
+<file path=ppt/slides/slide51.xml><?xml version="1.0" encoding="utf-8"?>
 <p:sld xmlns:a="http://schemas.openxmlformats.org/drawingml/2006/main" xmlns:r="http://schemas.openxmlformats.org/officeDocument/2006/relationships" xmlns:p="http://schemas.openxmlformats.org/presentationml/2006/main">
   <p:cSld>
     <p:spTree>
@@ -16847,7 +17008,7 @@
 </p:sld>
 </file>
 
-<file path=ppt/slides/slide51.xml><?xml version="1.0" encoding="utf-8"?>
+<file path=ppt/slides/slide52.xml><?xml version="1.0" encoding="utf-8"?>
 <p:sld xmlns:a="http://schemas.openxmlformats.org/drawingml/2006/main" xmlns:r="http://schemas.openxmlformats.org/officeDocument/2006/relationships" xmlns:p="http://schemas.openxmlformats.org/presentationml/2006/main">
   <p:cSld>
     <p:spTree>
@@ -17004,7 +17165,7 @@
 </p:sld>
 </file>
 
-<file path=ppt/slides/slide52.xml><?xml version="1.0" encoding="utf-8"?>
+<file path=ppt/slides/slide53.xml><?xml version="1.0" encoding="utf-8"?>
 <p:sld xmlns:a="http://schemas.openxmlformats.org/drawingml/2006/main" xmlns:r="http://schemas.openxmlformats.org/officeDocument/2006/relationships" xmlns:p="http://schemas.openxmlformats.org/presentationml/2006/main">
   <p:cSld>
     <p:spTree>
@@ -17145,7 +17306,7 @@
 </p:sld>
 </file>
 
-<file path=ppt/slides/slide53.xml><?xml version="1.0" encoding="utf-8"?>
+<file path=ppt/slides/slide54.xml><?xml version="1.0" encoding="utf-8"?>
 <p:sld xmlns:a="http://schemas.openxmlformats.org/drawingml/2006/main" xmlns:r="http://schemas.openxmlformats.org/officeDocument/2006/relationships" xmlns:p="http://schemas.openxmlformats.org/presentationml/2006/main">
   <p:cSld>
     <p:spTree>

</xml_diff>